<commit_message>
added covid policy page, comments in 1st day slides
</commit_message>
<xml_diff>
--- a/slides/courseintroduction.pptx
+++ b/slides/courseintroduction.pptx
@@ -237,6 +237,74 @@
 </p:presentation>
 </file>
 
+<file path=ppt/commentAuthors.xml><?xml version="1.0" encoding="utf-8"?>
+<p:cmAuthorLst xmlns:a="http://schemas.openxmlformats.org/drawingml/2006/main" xmlns:r="http://schemas.openxmlformats.org/officeDocument/2006/relationships" xmlns:p="http://schemas.openxmlformats.org/presentationml/2006/main">
+  <p:cmAuthor id="1" name="Horton, Tom (tbh3f)" initials="HT(" lastIdx="5" clrIdx="0">
+    <p:extLst>
+      <p:ext uri="{19B8F6BF-5375-455C-9EA6-DF929625EA0E}">
+        <p15:presenceInfo xmlns:p15="http://schemas.microsoft.com/office/powerpoint/2012/main" userId="S::tbh3f@virginia.edu::db589c69-5451-4833-9298-0c009cd53272" providerId="AD"/>
+      </p:ext>
+    </p:extLst>
+  </p:cmAuthor>
+</p:cmAuthorLst>
+</file>
+
+<file path=ppt/comments/comment1.xml><?xml version="1.0" encoding="utf-8"?>
+<p:cmLst xmlns:a="http://schemas.openxmlformats.org/drawingml/2006/main" xmlns:r="http://schemas.openxmlformats.org/officeDocument/2006/relationships" xmlns:p="http://schemas.openxmlformats.org/presentationml/2006/main">
+  <p:cm authorId="1" dt="2021-08-23T10:41:17.927" idx="2">
+    <p:pos x="5003" y="1299"/>
+    <p:text>"minimum needed" sounds less positive than I think we mean.  It's not D-level, it's competency, right?</p:text>
+    <p:extLst>
+      <p:ext uri="{C676402C-5697-4E1C-873F-D02D1690AC5C}">
+        <p15:threadingInfo xmlns:p15="http://schemas.microsoft.com/office/powerpoint/2012/main" timeZoneBias="240"/>
+      </p:ext>
+    </p:extLst>
+  </p:cm>
+</p:cmLst>
+</file>
+
+<file path=ppt/comments/comment2.xml><?xml version="1.0" encoding="utf-8"?>
+<p:cmLst xmlns:a="http://schemas.openxmlformats.org/drawingml/2006/main" xmlns:r="http://schemas.openxmlformats.org/officeDocument/2006/relationships" xmlns:p="http://schemas.openxmlformats.org/presentationml/2006/main">
+  <p:cm authorId="1" dt="2021-08-23T10:53:49.505" idx="3">
+    <p:pos x="5466" y="1604"/>
+    <p:text>This seems like what we did last term, and not quite what we'll do this time.</p:text>
+    <p:extLst>
+      <p:ext uri="{C676402C-5697-4E1C-873F-D02D1690AC5C}">
+        <p15:threadingInfo xmlns:p15="http://schemas.microsoft.com/office/powerpoint/2012/main" timeZoneBias="240"/>
+      </p:ext>
+    </p:extLst>
+  </p:cm>
+</p:cmLst>
+</file>
+
+<file path=ppt/comments/comment3.xml><?xml version="1.0" encoding="utf-8"?>
+<p:cmLst xmlns:a="http://schemas.openxmlformats.org/drawingml/2006/main" xmlns:r="http://schemas.openxmlformats.org/officeDocument/2006/relationships" xmlns:p="http://schemas.openxmlformats.org/presentationml/2006/main">
+  <p:cm authorId="1" dt="2021-08-23T10:57:42.629" idx="4">
+    <p:pos x="5008" y="793"/>
+    <p:text>Do we want to link to department grading policy website?</p:text>
+    <p:extLst>
+      <p:ext uri="{C676402C-5697-4E1C-873F-D02D1690AC5C}">
+        <p15:threadingInfo xmlns:p15="http://schemas.microsoft.com/office/powerpoint/2012/main" timeZoneBias="240"/>
+      </p:ext>
+    </p:extLst>
+  </p:cm>
+</p:cmLst>
+</file>
+
+<file path=ppt/comments/comment4.xml><?xml version="1.0" encoding="utf-8"?>
+<p:cmLst xmlns:a="http://schemas.openxmlformats.org/drawingml/2006/main" xmlns:r="http://schemas.openxmlformats.org/officeDocument/2006/relationships" xmlns:p="http://schemas.openxmlformats.org/presentationml/2006/main">
+  <p:cm authorId="1" dt="2021-08-23T10:58:54.617" idx="5">
+    <p:pos x="2744" y="379"/>
+    <p:text>Again, some of what's here differs from what we discussed, I think!</p:text>
+    <p:extLst>
+      <p:ext uri="{C676402C-5697-4E1C-873F-D02D1690AC5C}">
+        <p15:threadingInfo xmlns:p15="http://schemas.microsoft.com/office/powerpoint/2012/main" timeZoneBias="240"/>
+      </p:ext>
+    </p:extLst>
+  </p:cm>
+</p:cmLst>
+</file>
+
 <file path=ppt/handoutMasters/handoutMaster1.xml><?xml version="1.0" encoding="utf-8"?>
 <p:handoutMaster xmlns:a="http://schemas.openxmlformats.org/drawingml/2006/main" xmlns:r="http://schemas.openxmlformats.org/officeDocument/2006/relationships" xmlns:p="http://schemas.openxmlformats.org/presentationml/2006/main">
   <p:cSld>
@@ -1412,7 +1480,7 @@
             <a:fld id="{E4886CB5-510A-4EF6-9466-BC7A8F0DDE87}" type="datetime1">
               <a:rPr lang="en-US" smtClean="0"/>
               <a:pPr/>
-              <a:t>8/18/21</a:t>
+              <a:t>8/23/21</a:t>
             </a:fld>
             <a:endParaRPr lang="en-US"/>
           </a:p>
@@ -1772,7 +1840,7 @@
             <a:fld id="{9B297853-24B4-4D05-83E4-0AD2E86C55E5}" type="datetime1">
               <a:rPr lang="en-US" smtClean="0"/>
               <a:pPr/>
-              <a:t>8/18/21</a:t>
+              <a:t>8/23/21</a:t>
             </a:fld>
             <a:endParaRPr lang="en-US"/>
           </a:p>
@@ -1948,7 +2016,7 @@
             <a:fld id="{01FCDD9E-5768-4705-9537-0C020B1BB310}" type="datetime1">
               <a:rPr lang="en-US" smtClean="0"/>
               <a:pPr/>
-              <a:t>8/18/21</a:t>
+              <a:t>8/23/21</a:t>
             </a:fld>
             <a:endParaRPr lang="en-US"/>
           </a:p>
@@ -2184,7 +2252,7 @@
             <a:fld id="{4257C27E-59C2-41CA-9776-94955CBEE440}" type="datetime1">
               <a:rPr lang="en-US" smtClean="0"/>
               <a:pPr/>
-              <a:t>8/18/21</a:t>
+              <a:t>8/23/21</a:t>
             </a:fld>
             <a:endParaRPr lang="en-US"/>
           </a:p>
@@ -2470,7 +2538,7 @@
             <a:fld id="{03180747-A137-49C6-9C74-AB7EE86F4904}" type="datetime1">
               <a:rPr lang="en-US" smtClean="0"/>
               <a:pPr/>
-              <a:t>8/18/21</a:t>
+              <a:t>8/23/21</a:t>
             </a:fld>
             <a:endParaRPr lang="en-US"/>
           </a:p>
@@ -2691,7 +2759,7 @@
             <a:fld id="{EBBA31D9-ADC1-480D-86A8-1EAFB6A86A35}" type="datetime1">
               <a:rPr lang="en-US" smtClean="0"/>
               <a:pPr/>
-              <a:t>8/18/21</a:t>
+              <a:t>8/23/21</a:t>
             </a:fld>
             <a:endParaRPr lang="en-US"/>
           </a:p>
@@ -3044,7 +3112,7 @@
             <a:fld id="{80AAE9AE-3B2F-4DEA-8C41-BDDF4CDF6F40}" type="datetime1">
               <a:rPr lang="en-US" smtClean="0"/>
               <a:pPr/>
-              <a:t>8/18/21</a:t>
+              <a:t>8/23/21</a:t>
             </a:fld>
             <a:endParaRPr lang="en-US"/>
           </a:p>
@@ -3277,7 +3345,7 @@
             <a:fld id="{48252F7F-E8FE-413B-8521-D4ED924C6DE5}" type="datetime1">
               <a:rPr lang="en-US" smtClean="0"/>
               <a:pPr/>
-              <a:t>8/18/21</a:t>
+              <a:t>8/23/21</a:t>
             </a:fld>
             <a:endParaRPr lang="en-US"/>
           </a:p>
@@ -3419,7 +3487,7 @@
             <a:fld id="{2FF1B124-70E3-4E4A-90E2-6B55DB7659B3}" type="datetime1">
               <a:rPr lang="en-US" smtClean="0"/>
               <a:pPr/>
-              <a:t>8/18/21</a:t>
+              <a:t>8/23/21</a:t>
             </a:fld>
             <a:endParaRPr lang="en-US"/>
           </a:p>
@@ -3697,7 +3765,7 @@
             <a:fld id="{4EBF4C98-3CD6-4C87-BD40-5718C2628835}" type="datetime1">
               <a:rPr lang="en-US" smtClean="0"/>
               <a:pPr/>
-              <a:t>8/18/21</a:t>
+              <a:t>8/23/21</a:t>
             </a:fld>
             <a:endParaRPr lang="en-US"/>
           </a:p>
@@ -4105,7 +4173,7 @@
             <a:fld id="{6D6408A8-6B1B-4CDA-875E-7BEECDBA31DF}" type="datetime1">
               <a:rPr lang="en-US" smtClean="0"/>
               <a:pPr/>
-              <a:t>8/18/21</a:t>
+              <a:t>8/23/21</a:t>
             </a:fld>
             <a:endParaRPr lang="en-US"/>
           </a:p>
@@ -4443,7 +4511,7 @@
             <a:fld id="{C55AAF07-D2F5-4B3C-B443-40DE8C337A77}" type="datetime1">
               <a:rPr lang="en-US" smtClean="0"/>
               <a:pPr/>
-              <a:t>8/18/21</a:t>
+              <a:t>8/23/21</a:t>
             </a:fld>
             <a:endParaRPr lang="en-US"/>
           </a:p>
@@ -6408,15 +6476,7 @@
           <a:p>
             <a:r>
               <a:rPr lang="en-US" dirty="0"/>
-              <a:t>On a programming </a:t>
-            </a:r>
-            <a:r>
-              <a:rPr lang="en-US" dirty="0" err="1"/>
-              <a:t>hw</a:t>
-            </a:r>
-            <a:r>
-              <a:rPr lang="en-US" dirty="0"/>
-              <a:t>, a pass might mean:</a:t>
+              <a:t>On a programming HW, a pass might mean:</a:t>
             </a:r>
           </a:p>
           <a:p>
@@ -6756,6 +6816,13 @@
             </a:r>
           </a:p>
           <a:p>
+            <a:pPr lvl="2"/>
+            <a:r>
+              <a:rPr lang="en-US" sz="1800" dirty="0"/>
+              <a:t>Remember: you get 3 attempts at Quizzes 1-8 and 2 attempts for Quizzes 9-10</a:t>
+            </a:r>
+          </a:p>
+          <a:p>
             <a:pPr lvl="1"/>
             <a:endParaRPr lang="en-US" sz="2100" dirty="0"/>
           </a:p>
@@ -6776,7 +6843,7 @@
             <a:pPr lvl="2"/>
             <a:r>
               <a:rPr lang="en-US" sz="1800" dirty="0"/>
-              <a:t>If we want to succeed, you need to try to hit these recommended deadlines</a:t>
+              <a:t>If you want to succeed, you need to try to hit these recommended deadlines</a:t>
             </a:r>
           </a:p>
           <a:p>
@@ -7814,7 +7881,7 @@
           <a:lstStyle/>
           <a:p>
             <a:r>
-              <a:rPr lang="en-US"/>
+              <a:rPr lang="en-US" dirty="0"/>
               <a:t>Working in groups</a:t>
             </a:r>
           </a:p>
@@ -8927,6 +8994,13 @@
               <a:t> to Piazza NOT email to instructors!</a:t>
             </a:r>
           </a:p>
+          <a:p>
+            <a:pPr lvl="2"/>
+            <a:r>
+              <a:rPr lang="en-US" dirty="0"/>
+              <a:t>Piazza preferred to Discord for most questions on HW, course policies</a:t>
+            </a:r>
+          </a:p>
         </p:txBody>
       </p:sp>
       <p:sp>
@@ -10846,15 +10920,21 @@
             <a:pPr lvl="1"/>
             <a:r>
               <a:rPr lang="en-US" dirty="0"/>
-              <a:t>General Q&amp;A with </a:t>
-            </a:r>
-            <a:r>
-              <a:rPr lang="en-US" dirty="0" err="1"/>
-              <a:t>Tas</a:t>
-            </a:r>
-            <a:r>
-              <a:rPr lang="en-US" dirty="0"/>
-              <a:t>, etc. (We will use piazza too)</a:t>
+              <a:t>General Q&amp;A with TAs, etc. (We will use Piazza too)</a:t>
+            </a:r>
+          </a:p>
+          <a:p>
+            <a:pPr lvl="2"/>
+            <a:r>
+              <a:rPr lang="en-US" dirty="0"/>
+              <a:t>Piazza: If you want instructors (and TAs) to see it</a:t>
+            </a:r>
+          </a:p>
+          <a:p>
+            <a:pPr lvl="2"/>
+            <a:r>
+              <a:rPr lang="en-US" dirty="0"/>
+              <a:t>Piazza: If someone else might search for this later</a:t>
             </a:r>
           </a:p>
           <a:p>
@@ -15071,6 +15151,13 @@
             </a:r>
           </a:p>
           <a:p>
+            <a:pPr lvl="1"/>
+            <a:r>
+              <a:rPr lang="en-US" dirty="0"/>
+              <a:t>Using Panopto, so not broadcast live (but auto-captioned)</a:t>
+            </a:r>
+          </a:p>
+          <a:p>
             <a:endParaRPr lang="en-US" dirty="0"/>
           </a:p>
           <a:p>
@@ -15191,7 +15278,7 @@
             <a:pPr lvl="1"/>
             <a:r>
               <a:rPr lang="en-US" i="1" dirty="0"/>
-              <a:t>Div. &amp; Con.: Insertion Sort, </a:t>
+              <a:t>Div. &amp; Conquer: Insertion Sort, </a:t>
             </a:r>
             <a:r>
               <a:rPr lang="en-US" i="1" dirty="0" err="1"/>
@@ -15206,21 +15293,21 @@
             <a:pPr lvl="1"/>
             <a:r>
               <a:rPr lang="en-US" i="1" dirty="0"/>
-              <a:t>Div. &amp; Con.: Recurrence Relations</a:t>
+              <a:t>Div. &amp; Conquer: Recurrence Relations</a:t>
             </a:r>
           </a:p>
           <a:p>
             <a:pPr lvl="1"/>
             <a:r>
               <a:rPr lang="en-US" i="1" dirty="0"/>
-              <a:t>Div. &amp; Con.: Advanced Topics</a:t>
+              <a:t>Div. &amp; Conquer: Advanced Topics</a:t>
             </a:r>
           </a:p>
           <a:p>
             <a:pPr lvl="1"/>
             <a:r>
               <a:rPr lang="en-US" i="1" dirty="0"/>
-              <a:t>Graphs: BFS &amp; DFS</a:t>
+              <a:t>Graphs: Breadth-first Search (BFS) &amp; Depth Search (DFS)</a:t>
             </a:r>
           </a:p>
           <a:p>

</xml_diff>

<commit_message>
first draft of syllabus, tweak to first day slides
</commit_message>
<xml_diff>
--- a/slides/courseintroduction.pptx
+++ b/slides/courseintroduction.pptx
@@ -15278,7 +15278,7 @@
             <a:pPr lvl="1"/>
             <a:r>
               <a:rPr lang="en-US" i="1" dirty="0"/>
-              <a:t>Div. &amp; Conquer: Insertion Sort, </a:t>
+              <a:t>Divide &amp; Conquer: Insertion Sort, </a:t>
             </a:r>
             <a:r>
               <a:rPr lang="en-US" i="1" dirty="0" err="1"/>
@@ -15293,14 +15293,14 @@
             <a:pPr lvl="1"/>
             <a:r>
               <a:rPr lang="en-US" i="1" dirty="0"/>
-              <a:t>Div. &amp; Conquer: Recurrence Relations</a:t>
+              <a:t>Divide &amp; Conquer: Recurrence Relations</a:t>
             </a:r>
           </a:p>
           <a:p>
             <a:pPr lvl="1"/>
             <a:r>
               <a:rPr lang="en-US" i="1" dirty="0"/>
-              <a:t>Div. &amp; Conquer: Advanced Topics</a:t>
+              <a:t>Divide &amp; Conquer: Advanced Topics</a:t>
             </a:r>
           </a:p>
           <a:p>

</xml_diff>